<commit_message>
Finalised v2 DevOpsMCR presentation
</commit_message>
<xml_diff>
--- a/DevOpsMCR/DevOps for a Microsoft guy - is it really possible.pptx
+++ b/DevOpsMCR/DevOps for a Microsoft guy - is it really possible.pptx
@@ -4354,7 +4354,7 @@
                                       <p:cBhvr>
                                         <p:cTn id="10" dur="1" fill="hold">
                                           <p:stCondLst>
-                                            <p:cond delay="2749"/>
+                                            <p:cond delay="9"/>
                                           </p:stCondLst>
                                         </p:cTn>
                                         <p:tgtEl>
@@ -4375,17 +4375,35 @@
                                   </p:childTnLst>
                                 </p:cTn>
                               </p:par>
+                            </p:childTnLst>
+                          </p:cTn>
+                        </p:par>
+                      </p:childTnLst>
+                    </p:cTn>
+                  </p:par>
+                  <p:par>
+                    <p:cTn id="11" fill="hold">
+                      <p:stCondLst>
+                        <p:cond delay="indefinite"/>
+                      </p:stCondLst>
+                      <p:childTnLst>
+                        <p:par>
+                          <p:cTn id="12" fill="hold">
+                            <p:stCondLst>
+                              <p:cond delay="0"/>
+                            </p:stCondLst>
+                            <p:childTnLst>
                               <p:par>
-                                <p:cTn id="11" presetID="1" presetClass="entr" presetSubtype="0" fill="hold" grpId="0" nodeType="withEffect">
+                                <p:cTn id="13" presetID="1" presetClass="entr" presetSubtype="0" fill="hold" grpId="0" nodeType="clickEffect">
                                   <p:stCondLst>
                                     <p:cond delay="0"/>
                                   </p:stCondLst>
                                   <p:childTnLst>
                                     <p:set>
                                       <p:cBhvr>
-                                        <p:cTn id="12" dur="1" fill="hold">
+                                        <p:cTn id="14" dur="1" fill="hold">
                                           <p:stCondLst>
-                                            <p:cond delay="2999"/>
+                                            <p:cond delay="9"/>
                                           </p:stCondLst>
                                         </p:cTn>
                                         <p:tgtEl>
@@ -4409,23 +4427,32 @@
                             </p:childTnLst>
                           </p:cTn>
                         </p:par>
+                      </p:childTnLst>
+                    </p:cTn>
+                  </p:par>
+                  <p:par>
+                    <p:cTn id="15" fill="hold">
+                      <p:stCondLst>
+                        <p:cond delay="indefinite"/>
+                      </p:stCondLst>
+                      <p:childTnLst>
                         <p:par>
-                          <p:cTn id="13" fill="hold">
+                          <p:cTn id="16" fill="hold">
                             <p:stCondLst>
-                              <p:cond delay="3000"/>
+                              <p:cond delay="0"/>
                             </p:stCondLst>
                             <p:childTnLst>
                               <p:par>
-                                <p:cTn id="14" presetID="1" presetClass="entr" presetSubtype="0" fill="hold" grpId="0" nodeType="afterEffect">
+                                <p:cTn id="17" presetID="1" presetClass="entr" presetSubtype="0" fill="hold" grpId="0" nodeType="clickEffect">
                                   <p:stCondLst>
                                     <p:cond delay="0"/>
                                   </p:stCondLst>
                                   <p:childTnLst>
                                     <p:set>
                                       <p:cBhvr>
-                                        <p:cTn id="15" dur="1" fill="hold">
+                                        <p:cTn id="18" dur="1" fill="hold">
                                           <p:stCondLst>
-                                            <p:cond delay="2999"/>
+                                            <p:cond delay="9"/>
                                           </p:stCondLst>
                                         </p:cTn>
                                         <p:tgtEl>
@@ -4447,16 +4474,16 @@
                                 </p:cTn>
                               </p:par>
                               <p:par>
-                                <p:cTn id="16" presetID="1" presetClass="entr" presetSubtype="0" fill="hold" grpId="0" nodeType="withEffect">
+                                <p:cTn id="19" presetID="1" presetClass="entr" presetSubtype="0" fill="hold" grpId="0" nodeType="withEffect">
                                   <p:stCondLst>
                                     <p:cond delay="0"/>
                                   </p:stCondLst>
                                   <p:childTnLst>
                                     <p:set>
                                       <p:cBhvr>
-                                        <p:cTn id="17" dur="1" fill="hold">
+                                        <p:cTn id="20" dur="1" fill="hold">
                                           <p:stCondLst>
-                                            <p:cond delay="2999"/>
+                                            <p:cond delay="9"/>
                                           </p:stCondLst>
                                         </p:cTn>
                                         <p:tgtEl>
@@ -4478,16 +4505,16 @@
                                 </p:cTn>
                               </p:par>
                               <p:par>
-                                <p:cTn id="18" presetID="1" presetClass="entr" presetSubtype="0" fill="hold" grpId="0" nodeType="withEffect">
+                                <p:cTn id="21" presetID="1" presetClass="entr" presetSubtype="0" fill="hold" grpId="0" nodeType="withEffect">
                                   <p:stCondLst>
                                     <p:cond delay="0"/>
                                   </p:stCondLst>
                                   <p:childTnLst>
                                     <p:set>
                                       <p:cBhvr>
-                                        <p:cTn id="19" dur="1" fill="hold">
+                                        <p:cTn id="22" dur="1" fill="hold">
                                           <p:stCondLst>
-                                            <p:cond delay="4999"/>
+                                            <p:cond delay="9"/>
                                           </p:stCondLst>
                                         </p:cTn>
                                         <p:tgtEl>
@@ -4509,16 +4536,16 @@
                                 </p:cTn>
                               </p:par>
                               <p:par>
-                                <p:cTn id="20" presetID="1" presetClass="entr" presetSubtype="0" fill="hold" grpId="0" nodeType="withEffect">
+                                <p:cTn id="23" presetID="1" presetClass="entr" presetSubtype="0" fill="hold" grpId="0" nodeType="withEffect">
                                   <p:stCondLst>
                                     <p:cond delay="0"/>
                                   </p:stCondLst>
                                   <p:childTnLst>
                                     <p:set>
                                       <p:cBhvr>
-                                        <p:cTn id="21" dur="1" fill="hold">
+                                        <p:cTn id="24" dur="1" fill="hold">
                                           <p:stCondLst>
-                                            <p:cond delay="3999"/>
+                                            <p:cond delay="9"/>
                                           </p:stCondLst>
                                         </p:cTn>
                                         <p:tgtEl>
@@ -4540,16 +4567,16 @@
                                 </p:cTn>
                               </p:par>
                               <p:par>
-                                <p:cTn id="22" presetID="1" presetClass="entr" presetSubtype="0" fill="hold" grpId="0" nodeType="withEffect">
+                                <p:cTn id="25" presetID="1" presetClass="entr" presetSubtype="0" fill="hold" grpId="0" nodeType="withEffect">
                                   <p:stCondLst>
                                     <p:cond delay="0"/>
                                   </p:stCondLst>
                                   <p:childTnLst>
                                     <p:set>
                                       <p:cBhvr>
-                                        <p:cTn id="23" dur="1" fill="hold">
+                                        <p:cTn id="26" dur="1" fill="hold">
                                           <p:stCondLst>
-                                            <p:cond delay="4999"/>
+                                            <p:cond delay="9"/>
                                           </p:stCondLst>
                                         </p:cTn>
                                         <p:tgtEl>
@@ -4577,26 +4604,26 @@
                     </p:cTn>
                   </p:par>
                   <p:par>
-                    <p:cTn id="24" fill="hold">
+                    <p:cTn id="27" fill="hold">
                       <p:stCondLst>
                         <p:cond delay="indefinite"/>
                       </p:stCondLst>
                       <p:childTnLst>
                         <p:par>
-                          <p:cTn id="25" fill="hold">
+                          <p:cTn id="28" fill="hold">
                             <p:stCondLst>
                               <p:cond delay="0"/>
                             </p:stCondLst>
                             <p:childTnLst>
                               <p:par>
-                                <p:cTn id="26" presetID="2" presetClass="entr" presetSubtype="4" fill="hold" grpId="0" nodeType="clickEffect">
+                                <p:cTn id="29" presetID="2" presetClass="entr" presetSubtype="4" fill="hold" grpId="0" nodeType="clickEffect">
                                   <p:stCondLst>
                                     <p:cond delay="0"/>
                                   </p:stCondLst>
                                   <p:childTnLst>
                                     <p:set>
                                       <p:cBhvr>
-                                        <p:cTn id="27" dur="1" fill="hold">
+                                        <p:cTn id="30" dur="1" fill="hold">
                                           <p:stCondLst>
                                             <p:cond delay="0"/>
                                           </p:stCondLst>
@@ -4614,7 +4641,7 @@
                                     </p:set>
                                     <p:anim calcmode="lin" valueType="num">
                                       <p:cBhvr additive="base">
-                                        <p:cTn id="28" dur="500" fill="hold"/>
+                                        <p:cTn id="31" dur="10" fill="hold"/>
                                         <p:tgtEl>
                                           <p:spTgt spid="8"/>
                                         </p:tgtEl>
@@ -4637,7 +4664,7 @@
                                     </p:anim>
                                     <p:anim calcmode="lin" valueType="num">
                                       <p:cBhvr additive="base">
-                                        <p:cTn id="29" dur="500" fill="hold"/>
+                                        <p:cTn id="32" dur="10" fill="hold"/>
                                         <p:tgtEl>
                                           <p:spTgt spid="8"/>
                                         </p:tgtEl>

</xml_diff>